<commit_message>
QR Code and link in slides
</commit_message>
<xml_diff>
--- a/doc/PPT_final/ Automatic Mixing.pptx
+++ b/doc/PPT_final/ Automatic Mixing.pptx
@@ -159,7 +159,7 @@
           <p:cNvPr id="2" name="Header Placeholder 1">
             <a:extLst>
               <a:ext uri="{FF2B5EF4-FFF2-40B4-BE49-F238E27FC236}">
-                <a16:creationId xmlns="" xmlns:a16="http://schemas.microsoft.com/office/drawing/2014/main" id="{840B08AC-E5DB-2346-9522-E13FDAED48B6}"/>
+                <a16:creationId xmlns:a16="http://schemas.microsoft.com/office/drawing/2014/main" xmlns="" id="{840B08AC-E5DB-2346-9522-E13FDAED48B6}"/>
               </a:ext>
             </a:extLst>
           </p:cNvPr>
@@ -196,7 +196,7 @@
           <p:cNvPr id="3" name="Date Placeholder 2">
             <a:extLst>
               <a:ext uri="{FF2B5EF4-FFF2-40B4-BE49-F238E27FC236}">
-                <a16:creationId xmlns="" xmlns:a16="http://schemas.microsoft.com/office/drawing/2014/main" id="{8FEF2A5E-8AC0-D242-BDB0-D48C52EC46F6}"/>
+                <a16:creationId xmlns:a16="http://schemas.microsoft.com/office/drawing/2014/main" xmlns="" id="{8FEF2A5E-8AC0-D242-BDB0-D48C52EC46F6}"/>
               </a:ext>
             </a:extLst>
           </p:cNvPr>
@@ -226,7 +226,7 @@
           <a:p>
             <a:fld id="{1790BDCF-FDED-7944-8BF6-2AC6A3D70E73}" type="datetimeFigureOut">
               <a:rPr lang="en-US" smtClean="0"/>
-              <a:t>11/15/22</a:t>
+              <a:t>11/24/22</a:t>
             </a:fld>
             <a:endParaRPr lang="en-US"/>
           </a:p>
@@ -237,7 +237,7 @@
           <p:cNvPr id="4" name="Footer Placeholder 3">
             <a:extLst>
               <a:ext uri="{FF2B5EF4-FFF2-40B4-BE49-F238E27FC236}">
-                <a16:creationId xmlns="" xmlns:a16="http://schemas.microsoft.com/office/drawing/2014/main" id="{04CDD624-43F6-2E45-9536-1E4A096D8D9B}"/>
+                <a16:creationId xmlns:a16="http://schemas.microsoft.com/office/drawing/2014/main" xmlns="" id="{04CDD624-43F6-2E45-9536-1E4A096D8D9B}"/>
               </a:ext>
             </a:extLst>
           </p:cNvPr>
@@ -274,7 +274,7 @@
           <p:cNvPr id="5" name="Slide Number Placeholder 4">
             <a:extLst>
               <a:ext uri="{FF2B5EF4-FFF2-40B4-BE49-F238E27FC236}">
-                <a16:creationId xmlns="" xmlns:a16="http://schemas.microsoft.com/office/drawing/2014/main" id="{4BD07A2B-CDBD-BE48-8A80-8CCEF44924D9}"/>
+                <a16:creationId xmlns:a16="http://schemas.microsoft.com/office/drawing/2014/main" xmlns="" id="{4BD07A2B-CDBD-BE48-8A80-8CCEF44924D9}"/>
               </a:ext>
             </a:extLst>
           </p:cNvPr>
@@ -403,7 +403,7 @@
           <a:p>
             <a:fld id="{7FC19A01-7786-9E40-A342-3F309B51F3C8}" type="datetimeFigureOut">
               <a:rPr lang="en-US" smtClean="0"/>
-              <a:t>11/15/22</a:t>
+              <a:t>11/24/22</a:t>
             </a:fld>
             <a:endParaRPr lang="en-US"/>
           </a:p>
@@ -887,7 +887,7 @@
           <p:cNvPr id="5" name="Graphic 4">
             <a:extLst>
               <a:ext uri="{FF2B5EF4-FFF2-40B4-BE49-F238E27FC236}">
-                <a16:creationId xmlns="" xmlns:a16="http://schemas.microsoft.com/office/drawing/2014/main" id="{19727A66-6455-4B6B-B6B0-C885C09984FC}"/>
+                <a16:creationId xmlns:a16="http://schemas.microsoft.com/office/drawing/2014/main" xmlns="" id="{19727A66-6455-4B6B-B6B0-C885C09984FC}"/>
               </a:ext>
             </a:extLst>
           </p:cNvPr>
@@ -900,7 +900,7 @@
           <a:blip r:embed="rId2">
             <a:extLst>
               <a:ext uri="{96DAC541-7B7A-43D3-8B79-37D633B846F1}">
-                <asvg:svgBlip xmlns="" xmlns:asvg="http://schemas.microsoft.com/office/drawing/2016/SVG/main" r:embed="rId3"/>
+                <asvg:svgBlip xmlns:asvg="http://schemas.microsoft.com/office/drawing/2016/SVG/main" xmlns="" r:embed="rId3"/>
               </a:ext>
             </a:extLst>
           </a:blip>
@@ -1074,7 +1074,7 @@
           <p:cNvPr id="16" name="TextBox 15">
             <a:extLst>
               <a:ext uri="{FF2B5EF4-FFF2-40B4-BE49-F238E27FC236}">
-                <a16:creationId xmlns="" xmlns:a16="http://schemas.microsoft.com/office/drawing/2014/main" id="{4F90BFBB-34F3-6C4E-AE14-F79FC96106B4}"/>
+                <a16:creationId xmlns:a16="http://schemas.microsoft.com/office/drawing/2014/main" xmlns="" id="{4F90BFBB-34F3-6C4E-AE14-F79FC96106B4}"/>
               </a:ext>
             </a:extLst>
           </p:cNvPr>
@@ -1111,7 +1111,7 @@
           <p:cNvPr id="17" name="TextBox 16">
             <a:extLst>
               <a:ext uri="{FF2B5EF4-FFF2-40B4-BE49-F238E27FC236}">
-                <a16:creationId xmlns="" xmlns:a16="http://schemas.microsoft.com/office/drawing/2014/main" id="{C69906DC-87C5-E442-8918-7F76D287958D}"/>
+                <a16:creationId xmlns:a16="http://schemas.microsoft.com/office/drawing/2014/main" xmlns="" id="{C69906DC-87C5-E442-8918-7F76D287958D}"/>
               </a:ext>
             </a:extLst>
           </p:cNvPr>
@@ -1164,7 +1164,7 @@
           <p:cNvPr id="18" name="Graphic 17">
             <a:extLst>
               <a:ext uri="{FF2B5EF4-FFF2-40B4-BE49-F238E27FC236}">
-                <a16:creationId xmlns="" xmlns:a16="http://schemas.microsoft.com/office/drawing/2014/main" id="{C2C99E5F-79BF-4DC9-BB46-FFC780AFFE85}"/>
+                <a16:creationId xmlns:a16="http://schemas.microsoft.com/office/drawing/2014/main" xmlns="" id="{C2C99E5F-79BF-4DC9-BB46-FFC780AFFE85}"/>
               </a:ext>
             </a:extLst>
           </p:cNvPr>
@@ -1177,7 +1177,7 @@
           <a:blip r:embed="rId2">
             <a:extLst>
               <a:ext uri="{96DAC541-7B7A-43D3-8B79-37D633B846F1}">
-                <asvg:svgBlip xmlns="" xmlns:asvg="http://schemas.microsoft.com/office/drawing/2016/SVG/main" r:embed="rId3"/>
+                <asvg:svgBlip xmlns:asvg="http://schemas.microsoft.com/office/drawing/2016/SVG/main" xmlns="" r:embed="rId3"/>
               </a:ext>
             </a:extLst>
           </a:blip>
@@ -1361,7 +1361,7 @@
           <p:cNvPr id="16" name="TextBox 15">
             <a:extLst>
               <a:ext uri="{FF2B5EF4-FFF2-40B4-BE49-F238E27FC236}">
-                <a16:creationId xmlns="" xmlns:a16="http://schemas.microsoft.com/office/drawing/2014/main" id="{00F103E9-D16A-EB46-9F7B-A8705483339D}"/>
+                <a16:creationId xmlns:a16="http://schemas.microsoft.com/office/drawing/2014/main" xmlns="" id="{00F103E9-D16A-EB46-9F7B-A8705483339D}"/>
               </a:ext>
             </a:extLst>
           </p:cNvPr>
@@ -1398,7 +1398,7 @@
           <p:cNvPr id="17" name="TextBox 16">
             <a:extLst>
               <a:ext uri="{FF2B5EF4-FFF2-40B4-BE49-F238E27FC236}">
-                <a16:creationId xmlns="" xmlns:a16="http://schemas.microsoft.com/office/drawing/2014/main" id="{66CFA407-F8A1-7642-9F56-93689CE11E42}"/>
+                <a16:creationId xmlns:a16="http://schemas.microsoft.com/office/drawing/2014/main" xmlns="" id="{66CFA407-F8A1-7642-9F56-93689CE11E42}"/>
               </a:ext>
             </a:extLst>
           </p:cNvPr>
@@ -1451,7 +1451,7 @@
           <p:cNvPr id="18" name="Graphic 17">
             <a:extLst>
               <a:ext uri="{FF2B5EF4-FFF2-40B4-BE49-F238E27FC236}">
-                <a16:creationId xmlns="" xmlns:a16="http://schemas.microsoft.com/office/drawing/2014/main" id="{E219413A-BB37-4E7C-B085-A0D943A15432}"/>
+                <a16:creationId xmlns:a16="http://schemas.microsoft.com/office/drawing/2014/main" xmlns="" id="{E219413A-BB37-4E7C-B085-A0D943A15432}"/>
               </a:ext>
             </a:extLst>
           </p:cNvPr>
@@ -1464,7 +1464,7 @@
           <a:blip r:embed="rId2">
             <a:extLst>
               <a:ext uri="{96DAC541-7B7A-43D3-8B79-37D633B846F1}">
-                <asvg:svgBlip xmlns="" xmlns:asvg="http://schemas.microsoft.com/office/drawing/2016/SVG/main" r:embed="rId3"/>
+                <asvg:svgBlip xmlns:asvg="http://schemas.microsoft.com/office/drawing/2016/SVG/main" xmlns="" r:embed="rId3"/>
               </a:ext>
             </a:extLst>
           </a:blip>
@@ -1877,7 +1877,7 @@
           <p:cNvPr id="15" name="Graphic 14">
             <a:extLst>
               <a:ext uri="{FF2B5EF4-FFF2-40B4-BE49-F238E27FC236}">
-                <a16:creationId xmlns="" xmlns:a16="http://schemas.microsoft.com/office/drawing/2014/main" id="{94289BB5-E802-4E3E-9EF3-493812A6E29A}"/>
+                <a16:creationId xmlns:a16="http://schemas.microsoft.com/office/drawing/2014/main" xmlns="" id="{94289BB5-E802-4E3E-9EF3-493812A6E29A}"/>
               </a:ext>
             </a:extLst>
           </p:cNvPr>
@@ -1890,7 +1890,7 @@
           <a:blip r:embed="rId2">
             <a:extLst>
               <a:ext uri="{96DAC541-7B7A-43D3-8B79-37D633B846F1}">
-                <asvg:svgBlip xmlns="" xmlns:asvg="http://schemas.microsoft.com/office/drawing/2016/SVG/main" r:embed="rId3"/>
+                <asvg:svgBlip xmlns:asvg="http://schemas.microsoft.com/office/drawing/2016/SVG/main" xmlns="" r:embed="rId3"/>
               </a:ext>
             </a:extLst>
           </a:blip>
@@ -2071,7 +2071,7 @@
           <p:cNvPr id="28" name="TextBox 27">
             <a:extLst>
               <a:ext uri="{FF2B5EF4-FFF2-40B4-BE49-F238E27FC236}">
-                <a16:creationId xmlns="" xmlns:a16="http://schemas.microsoft.com/office/drawing/2014/main" id="{E766909F-446E-5A44-9EA1-75B086A02941}"/>
+                <a16:creationId xmlns:a16="http://schemas.microsoft.com/office/drawing/2014/main" xmlns="" id="{E766909F-446E-5A44-9EA1-75B086A02941}"/>
               </a:ext>
             </a:extLst>
           </p:cNvPr>
@@ -2108,7 +2108,7 @@
           <p:cNvPr id="6" name="Graphic 5">
             <a:extLst>
               <a:ext uri="{FF2B5EF4-FFF2-40B4-BE49-F238E27FC236}">
-                <a16:creationId xmlns="" xmlns:a16="http://schemas.microsoft.com/office/drawing/2014/main" id="{5C1EAA8F-F34E-45FC-9E10-C12246B4945A}"/>
+                <a16:creationId xmlns:a16="http://schemas.microsoft.com/office/drawing/2014/main" xmlns="" id="{5C1EAA8F-F34E-45FC-9E10-C12246B4945A}"/>
               </a:ext>
             </a:extLst>
           </p:cNvPr>
@@ -2121,7 +2121,7 @@
           <a:blip r:embed="rId2">
             <a:extLst>
               <a:ext uri="{96DAC541-7B7A-43D3-8B79-37D633B846F1}">
-                <asvg:svgBlip xmlns="" xmlns:asvg="http://schemas.microsoft.com/office/drawing/2016/SVG/main" r:embed="rId3"/>
+                <asvg:svgBlip xmlns:asvg="http://schemas.microsoft.com/office/drawing/2016/SVG/main" xmlns="" r:embed="rId3"/>
               </a:ext>
             </a:extLst>
           </a:blip>
@@ -2372,7 +2372,7 @@
           <p:cNvPr id="18" name="TextBox 17">
             <a:extLst>
               <a:ext uri="{FF2B5EF4-FFF2-40B4-BE49-F238E27FC236}">
-                <a16:creationId xmlns="" xmlns:a16="http://schemas.microsoft.com/office/drawing/2014/main" id="{B09DEBDD-94B7-DE41-A403-C96CB3E1D8AE}"/>
+                <a16:creationId xmlns:a16="http://schemas.microsoft.com/office/drawing/2014/main" xmlns="" id="{B09DEBDD-94B7-DE41-A403-C96CB3E1D8AE}"/>
               </a:ext>
             </a:extLst>
           </p:cNvPr>
@@ -2409,7 +2409,7 @@
           <p:cNvPr id="19" name="TextBox 18">
             <a:extLst>
               <a:ext uri="{FF2B5EF4-FFF2-40B4-BE49-F238E27FC236}">
-                <a16:creationId xmlns="" xmlns:a16="http://schemas.microsoft.com/office/drawing/2014/main" id="{EB58DFE1-15D0-9443-B5D0-33A92FE3806F}"/>
+                <a16:creationId xmlns:a16="http://schemas.microsoft.com/office/drawing/2014/main" xmlns="" id="{EB58DFE1-15D0-9443-B5D0-33A92FE3806F}"/>
               </a:ext>
             </a:extLst>
           </p:cNvPr>
@@ -2462,7 +2462,7 @@
           <p:cNvPr id="17" name="Graphic 16">
             <a:extLst>
               <a:ext uri="{FF2B5EF4-FFF2-40B4-BE49-F238E27FC236}">
-                <a16:creationId xmlns="" xmlns:a16="http://schemas.microsoft.com/office/drawing/2014/main" id="{16F8265F-1D5C-47BE-B72E-76932958F3A6}"/>
+                <a16:creationId xmlns:a16="http://schemas.microsoft.com/office/drawing/2014/main" xmlns="" id="{16F8265F-1D5C-47BE-B72E-76932958F3A6}"/>
               </a:ext>
             </a:extLst>
           </p:cNvPr>
@@ -2475,7 +2475,7 @@
           <a:blip r:embed="rId2">
             <a:extLst>
               <a:ext uri="{96DAC541-7B7A-43D3-8B79-37D633B846F1}">
-                <asvg:svgBlip xmlns="" xmlns:asvg="http://schemas.microsoft.com/office/drawing/2016/SVG/main" r:embed="rId3"/>
+                <asvg:svgBlip xmlns:asvg="http://schemas.microsoft.com/office/drawing/2016/SVG/main" xmlns="" r:embed="rId3"/>
               </a:ext>
             </a:extLst>
           </a:blip>
@@ -2787,7 +2787,7 @@
           <p:cNvPr id="19" name="TextBox 18">
             <a:extLst>
               <a:ext uri="{FF2B5EF4-FFF2-40B4-BE49-F238E27FC236}">
-                <a16:creationId xmlns="" xmlns:a16="http://schemas.microsoft.com/office/drawing/2014/main" id="{BEF3DDB2-0665-BB4D-A7BB-D6E15B1BDEBE}"/>
+                <a16:creationId xmlns:a16="http://schemas.microsoft.com/office/drawing/2014/main" xmlns="" id="{BEF3DDB2-0665-BB4D-A7BB-D6E15B1BDEBE}"/>
               </a:ext>
             </a:extLst>
           </p:cNvPr>
@@ -2824,7 +2824,7 @@
           <p:cNvPr id="20" name="TextBox 19">
             <a:extLst>
               <a:ext uri="{FF2B5EF4-FFF2-40B4-BE49-F238E27FC236}">
-                <a16:creationId xmlns="" xmlns:a16="http://schemas.microsoft.com/office/drawing/2014/main" id="{C2F0BE45-414F-044C-A933-3D62AEBB17B5}"/>
+                <a16:creationId xmlns:a16="http://schemas.microsoft.com/office/drawing/2014/main" xmlns="" id="{C2F0BE45-414F-044C-A933-3D62AEBB17B5}"/>
               </a:ext>
             </a:extLst>
           </p:cNvPr>
@@ -2877,7 +2877,7 @@
           <p:cNvPr id="18" name="Graphic 17">
             <a:extLst>
               <a:ext uri="{FF2B5EF4-FFF2-40B4-BE49-F238E27FC236}">
-                <a16:creationId xmlns="" xmlns:a16="http://schemas.microsoft.com/office/drawing/2014/main" id="{679613E3-F659-4F6B-A525-3814C323F7E8}"/>
+                <a16:creationId xmlns:a16="http://schemas.microsoft.com/office/drawing/2014/main" xmlns="" id="{679613E3-F659-4F6B-A525-3814C323F7E8}"/>
               </a:ext>
             </a:extLst>
           </p:cNvPr>
@@ -2890,7 +2890,7 @@
           <a:blip r:embed="rId2">
             <a:extLst>
               <a:ext uri="{96DAC541-7B7A-43D3-8B79-37D633B846F1}">
-                <asvg:svgBlip xmlns="" xmlns:asvg="http://schemas.microsoft.com/office/drawing/2016/SVG/main" r:embed="rId3"/>
+                <asvg:svgBlip xmlns:asvg="http://schemas.microsoft.com/office/drawing/2016/SVG/main" xmlns="" r:embed="rId3"/>
               </a:ext>
             </a:extLst>
           </a:blip>
@@ -3012,7 +3012,7 @@
           <p:cNvPr id="15" name="TextBox 14">
             <a:extLst>
               <a:ext uri="{FF2B5EF4-FFF2-40B4-BE49-F238E27FC236}">
-                <a16:creationId xmlns="" xmlns:a16="http://schemas.microsoft.com/office/drawing/2014/main" id="{61E30C84-59E8-9E44-A555-8B1373AB1B1A}"/>
+                <a16:creationId xmlns:a16="http://schemas.microsoft.com/office/drawing/2014/main" xmlns="" id="{61E30C84-59E8-9E44-A555-8B1373AB1B1A}"/>
               </a:ext>
             </a:extLst>
           </p:cNvPr>
@@ -3049,7 +3049,7 @@
           <p:cNvPr id="16" name="TextBox 15">
             <a:extLst>
               <a:ext uri="{FF2B5EF4-FFF2-40B4-BE49-F238E27FC236}">
-                <a16:creationId xmlns="" xmlns:a16="http://schemas.microsoft.com/office/drawing/2014/main" id="{F2BA38A8-83A5-E149-BF88-F17D812DBE80}"/>
+                <a16:creationId xmlns:a16="http://schemas.microsoft.com/office/drawing/2014/main" xmlns="" id="{F2BA38A8-83A5-E149-BF88-F17D812DBE80}"/>
               </a:ext>
             </a:extLst>
           </p:cNvPr>
@@ -3102,7 +3102,7 @@
           <p:cNvPr id="18" name="Graphic 17">
             <a:extLst>
               <a:ext uri="{FF2B5EF4-FFF2-40B4-BE49-F238E27FC236}">
-                <a16:creationId xmlns="" xmlns:a16="http://schemas.microsoft.com/office/drawing/2014/main" id="{F533209D-E000-476D-B7FA-1A35997E0521}"/>
+                <a16:creationId xmlns:a16="http://schemas.microsoft.com/office/drawing/2014/main" xmlns="" id="{F533209D-E000-476D-B7FA-1A35997E0521}"/>
               </a:ext>
             </a:extLst>
           </p:cNvPr>
@@ -3115,7 +3115,7 @@
           <a:blip r:embed="rId2">
             <a:extLst>
               <a:ext uri="{96DAC541-7B7A-43D3-8B79-37D633B846F1}">
-                <asvg:svgBlip xmlns="" xmlns:asvg="http://schemas.microsoft.com/office/drawing/2016/SVG/main" r:embed="rId3"/>
+                <asvg:svgBlip xmlns:asvg="http://schemas.microsoft.com/office/drawing/2016/SVG/main" xmlns="" r:embed="rId3"/>
               </a:ext>
             </a:extLst>
           </a:blip>
@@ -3214,7 +3214,7 @@
           <p:cNvPr id="19" name="TextBox 18">
             <a:extLst>
               <a:ext uri="{FF2B5EF4-FFF2-40B4-BE49-F238E27FC236}">
-                <a16:creationId xmlns="" xmlns:a16="http://schemas.microsoft.com/office/drawing/2014/main" id="{3814FAE4-C3CE-8945-8C50-23225D3560EE}"/>
+                <a16:creationId xmlns:a16="http://schemas.microsoft.com/office/drawing/2014/main" xmlns="" id="{3814FAE4-C3CE-8945-8C50-23225D3560EE}"/>
               </a:ext>
             </a:extLst>
           </p:cNvPr>
@@ -3251,7 +3251,7 @@
           <p:cNvPr id="20" name="TextBox 19">
             <a:extLst>
               <a:ext uri="{FF2B5EF4-FFF2-40B4-BE49-F238E27FC236}">
-                <a16:creationId xmlns="" xmlns:a16="http://schemas.microsoft.com/office/drawing/2014/main" id="{ED8E22FF-8F07-5448-88EA-2ADF8A34A1E6}"/>
+                <a16:creationId xmlns:a16="http://schemas.microsoft.com/office/drawing/2014/main" xmlns="" id="{ED8E22FF-8F07-5448-88EA-2ADF8A34A1E6}"/>
               </a:ext>
             </a:extLst>
           </p:cNvPr>
@@ -3304,7 +3304,7 @@
           <p:cNvPr id="14" name="Graphic 13">
             <a:extLst>
               <a:ext uri="{FF2B5EF4-FFF2-40B4-BE49-F238E27FC236}">
-                <a16:creationId xmlns="" xmlns:a16="http://schemas.microsoft.com/office/drawing/2014/main" id="{AB16132E-0B74-4CB4-818A-E7CB3F95FB55}"/>
+                <a16:creationId xmlns:a16="http://schemas.microsoft.com/office/drawing/2014/main" xmlns="" id="{AB16132E-0B74-4CB4-818A-E7CB3F95FB55}"/>
               </a:ext>
             </a:extLst>
           </p:cNvPr>
@@ -3317,7 +3317,7 @@
           <a:blip r:embed="rId2">
             <a:extLst>
               <a:ext uri="{96DAC541-7B7A-43D3-8B79-37D633B846F1}">
-                <asvg:svgBlip xmlns="" xmlns:asvg="http://schemas.microsoft.com/office/drawing/2016/SVG/main" r:embed="rId3"/>
+                <asvg:svgBlip xmlns:asvg="http://schemas.microsoft.com/office/drawing/2016/SVG/main" xmlns="" r:embed="rId3"/>
               </a:ext>
             </a:extLst>
           </a:blip>
@@ -3598,7 +3598,7 @@
           <p:cNvPr id="17" name="TextBox 16">
             <a:extLst>
               <a:ext uri="{FF2B5EF4-FFF2-40B4-BE49-F238E27FC236}">
-                <a16:creationId xmlns="" xmlns:a16="http://schemas.microsoft.com/office/drawing/2014/main" id="{EF90A807-0D75-8046-B1F9-FB7BE21BCEB5}"/>
+                <a16:creationId xmlns:a16="http://schemas.microsoft.com/office/drawing/2014/main" xmlns="" id="{EF90A807-0D75-8046-B1F9-FB7BE21BCEB5}"/>
               </a:ext>
             </a:extLst>
           </p:cNvPr>
@@ -3635,7 +3635,7 @@
           <p:cNvPr id="18" name="TextBox 17">
             <a:extLst>
               <a:ext uri="{FF2B5EF4-FFF2-40B4-BE49-F238E27FC236}">
-                <a16:creationId xmlns="" xmlns:a16="http://schemas.microsoft.com/office/drawing/2014/main" id="{DB11F5CE-32A3-7C4F-9727-B808DCFEDD2D}"/>
+                <a16:creationId xmlns:a16="http://schemas.microsoft.com/office/drawing/2014/main" xmlns="" id="{DB11F5CE-32A3-7C4F-9727-B808DCFEDD2D}"/>
               </a:ext>
             </a:extLst>
           </p:cNvPr>
@@ -3688,7 +3688,7 @@
           <p:cNvPr id="19" name="Graphic 18">
             <a:extLst>
               <a:ext uri="{FF2B5EF4-FFF2-40B4-BE49-F238E27FC236}">
-                <a16:creationId xmlns="" xmlns:a16="http://schemas.microsoft.com/office/drawing/2014/main" id="{EBD44E6D-3D6F-4868-AA74-A0E507BB7E75}"/>
+                <a16:creationId xmlns:a16="http://schemas.microsoft.com/office/drawing/2014/main" xmlns="" id="{EBD44E6D-3D6F-4868-AA74-A0E507BB7E75}"/>
               </a:ext>
             </a:extLst>
           </p:cNvPr>
@@ -3701,7 +3701,7 @@
           <a:blip r:embed="rId2">
             <a:extLst>
               <a:ext uri="{96DAC541-7B7A-43D3-8B79-37D633B846F1}">
-                <asvg:svgBlip xmlns="" xmlns:asvg="http://schemas.microsoft.com/office/drawing/2016/SVG/main" r:embed="rId3"/>
+                <asvg:svgBlip xmlns:asvg="http://schemas.microsoft.com/office/drawing/2016/SVG/main" xmlns="" r:embed="rId3"/>
               </a:ext>
             </a:extLst>
           </a:blip>
@@ -3962,7 +3962,7 @@
           <p:cNvPr id="17" name="TextBox 16">
             <a:extLst>
               <a:ext uri="{FF2B5EF4-FFF2-40B4-BE49-F238E27FC236}">
-                <a16:creationId xmlns="" xmlns:a16="http://schemas.microsoft.com/office/drawing/2014/main" id="{3CAF80FF-3C5D-6F43-8A74-58134F834FB5}"/>
+                <a16:creationId xmlns:a16="http://schemas.microsoft.com/office/drawing/2014/main" xmlns="" id="{3CAF80FF-3C5D-6F43-8A74-58134F834FB5}"/>
               </a:ext>
             </a:extLst>
           </p:cNvPr>
@@ -3999,7 +3999,7 @@
           <p:cNvPr id="18" name="TextBox 17">
             <a:extLst>
               <a:ext uri="{FF2B5EF4-FFF2-40B4-BE49-F238E27FC236}">
-                <a16:creationId xmlns="" xmlns:a16="http://schemas.microsoft.com/office/drawing/2014/main" id="{4024CBF7-36BB-C848-9C0A-A657B15810D9}"/>
+                <a16:creationId xmlns:a16="http://schemas.microsoft.com/office/drawing/2014/main" xmlns="" id="{4024CBF7-36BB-C848-9C0A-A657B15810D9}"/>
               </a:ext>
             </a:extLst>
           </p:cNvPr>
@@ -4052,7 +4052,7 @@
           <p:cNvPr id="19" name="Graphic 18">
             <a:extLst>
               <a:ext uri="{FF2B5EF4-FFF2-40B4-BE49-F238E27FC236}">
-                <a16:creationId xmlns="" xmlns:a16="http://schemas.microsoft.com/office/drawing/2014/main" id="{E0509593-4E93-46FF-B3D2-A6EC0CBF0985}"/>
+                <a16:creationId xmlns:a16="http://schemas.microsoft.com/office/drawing/2014/main" xmlns="" id="{E0509593-4E93-46FF-B3D2-A6EC0CBF0985}"/>
               </a:ext>
             </a:extLst>
           </p:cNvPr>
@@ -4065,7 +4065,7 @@
           <a:blip r:embed="rId2">
             <a:extLst>
               <a:ext uri="{96DAC541-7B7A-43D3-8B79-37D633B846F1}">
-                <asvg:svgBlip xmlns="" xmlns:asvg="http://schemas.microsoft.com/office/drawing/2016/SVG/main" r:embed="rId3"/>
+                <asvg:svgBlip xmlns:asvg="http://schemas.microsoft.com/office/drawing/2016/SVG/main" xmlns="" r:embed="rId3"/>
               </a:ext>
             </a:extLst>
           </a:blip>
@@ -4540,7 +4540,7 @@
           <p:cNvPr id="2" name="Title 1">
             <a:extLst>
               <a:ext uri="{FF2B5EF4-FFF2-40B4-BE49-F238E27FC236}">
-                <a16:creationId xmlns="" xmlns:a16="http://schemas.microsoft.com/office/drawing/2014/main" id="{B100FC07-DFB9-468B-95C1-22281A00D4C4}"/>
+                <a16:creationId xmlns:a16="http://schemas.microsoft.com/office/drawing/2014/main" xmlns="" id="{B100FC07-DFB9-468B-95C1-22281A00D4C4}"/>
               </a:ext>
             </a:extLst>
           </p:cNvPr>
@@ -4576,7 +4576,7 @@
           <p:cNvPr id="3" name="Subtitle 2">
             <a:extLst>
               <a:ext uri="{FF2B5EF4-FFF2-40B4-BE49-F238E27FC236}">
-                <a16:creationId xmlns="" xmlns:a16="http://schemas.microsoft.com/office/drawing/2014/main" id="{F939B8E8-A3AB-46B3-8726-E933C8297D94}"/>
+                <a16:creationId xmlns:a16="http://schemas.microsoft.com/office/drawing/2014/main" xmlns="" id="{F939B8E8-A3AB-46B3-8726-E933C8297D94}"/>
               </a:ext>
             </a:extLst>
           </p:cNvPr>
@@ -4655,7 +4655,7 @@
           <p:cNvPr id="2" name="Title 1">
             <a:extLst>
               <a:ext uri="{FF2B5EF4-FFF2-40B4-BE49-F238E27FC236}">
-                <a16:creationId xmlns="" xmlns:a16="http://schemas.microsoft.com/office/drawing/2014/main" id="{9045A477-9EA3-4F5C-B4B9-8CE29E6FF138}"/>
+                <a16:creationId xmlns:a16="http://schemas.microsoft.com/office/drawing/2014/main" xmlns="" id="{9045A477-9EA3-4F5C-B4B9-8CE29E6FF138}"/>
               </a:ext>
             </a:extLst>
           </p:cNvPr>
@@ -5145,7 +5145,7 @@
           <p:cNvPr id="2" name="Title 1">
             <a:extLst>
               <a:ext uri="{FF2B5EF4-FFF2-40B4-BE49-F238E27FC236}">
-                <a16:creationId xmlns="" xmlns:a16="http://schemas.microsoft.com/office/drawing/2014/main" id="{9045A477-9EA3-4F5C-B4B9-8CE29E6FF138}"/>
+                <a16:creationId xmlns:a16="http://schemas.microsoft.com/office/drawing/2014/main" xmlns="" id="{9045A477-9EA3-4F5C-B4B9-8CE29E6FF138}"/>
               </a:ext>
             </a:extLst>
           </p:cNvPr>
@@ -5481,15 +5481,26 @@
             <p:ph type="title"/>
           </p:nvPr>
         </p:nvSpPr>
-        <p:spPr/>
+        <p:spPr>
+          <a:xfrm>
+            <a:off x="505968" y="11234"/>
+            <a:ext cx="7235952" cy="4005181"/>
+          </a:xfrm>
+        </p:spPr>
         <p:txBody>
           <a:bodyPr/>
           <a:lstStyle/>
           <a:p>
             <a:pPr algn="ctr"/>
             <a:r>
+              <a:rPr lang="en-US" dirty="0">
+                <a:hlinkClick r:id="rId2"/>
+              </a:rPr>
+              <a:t>https://t.ly/0kur</a:t>
+            </a:r>
+            <a:r>
               <a:rPr lang="en-US" dirty="0" smtClean="0"/>
-              <a:t>[Short link to the survey]</a:t>
+              <a:t/>
             </a:r>
             <a:br>
               <a:rPr lang="en-US" dirty="0" smtClean="0"/>
@@ -5501,14 +5512,40 @@
             <a:br>
               <a:rPr lang="en-US" dirty="0"/>
             </a:br>
-            <a:r>
-              <a:rPr lang="en-US" dirty="0" smtClean="0"/>
-              <a:t>[QR code]</a:t>
-            </a:r>
             <a:endParaRPr lang="en-US" dirty="0"/>
           </a:p>
         </p:txBody>
       </p:sp>
+      <p:pic>
+        <p:nvPicPr>
+          <p:cNvPr id="3" name="Picture 2"/>
+          <p:cNvPicPr>
+            <a:picLocks noChangeAspect="1"/>
+          </p:cNvPicPr>
+          <p:nvPr/>
+        </p:nvPicPr>
+        <p:blipFill>
+          <a:blip r:embed="rId3">
+            <a:extLst>
+              <a:ext uri="{28A0092B-C50C-407E-A947-70E740481C1C}">
+                <a14:useLocalDpi xmlns:a14="http://schemas.microsoft.com/office/drawing/2010/main" val="0"/>
+              </a:ext>
+            </a:extLst>
+          </a:blip>
+          <a:stretch>
+            <a:fillRect/>
+          </a:stretch>
+        </p:blipFill>
+        <p:spPr>
+          <a:xfrm>
+            <a:off x="2536444" y="2172976"/>
+            <a:ext cx="3175000" cy="3175000"/>
+          </a:xfrm>
+          <a:prstGeom prst="rect">
+            <a:avLst/>
+          </a:prstGeom>
+        </p:spPr>
+      </p:pic>
     </p:spTree>
     <p:extLst>
       <p:ext uri="{BB962C8B-B14F-4D97-AF65-F5344CB8AC3E}">
@@ -5551,7 +5588,7 @@
           <p:cNvPr id="2" name="Title 1">
             <a:extLst>
               <a:ext uri="{FF2B5EF4-FFF2-40B4-BE49-F238E27FC236}">
-                <a16:creationId xmlns="" xmlns:a16="http://schemas.microsoft.com/office/drawing/2014/main" id="{9045A477-9EA3-4F5C-B4B9-8CE29E6FF138}"/>
+                <a16:creationId xmlns:a16="http://schemas.microsoft.com/office/drawing/2014/main" xmlns="" id="{9045A477-9EA3-4F5C-B4B9-8CE29E6FF138}"/>
               </a:ext>
             </a:extLst>
           </p:cNvPr>
@@ -5580,7 +5617,7 @@
           <p:cNvPr id="3" name="Content Placeholder 2">
             <a:extLst>
               <a:ext uri="{FF2B5EF4-FFF2-40B4-BE49-F238E27FC236}">
-                <a16:creationId xmlns="" xmlns:a16="http://schemas.microsoft.com/office/drawing/2014/main" id="{4FFC9F3E-C7DF-44CE-A057-14D5228F5C26}"/>
+                <a16:creationId xmlns:a16="http://schemas.microsoft.com/office/drawing/2014/main" xmlns="" id="{4FFC9F3E-C7DF-44CE-A057-14D5228F5C26}"/>
               </a:ext>
             </a:extLst>
           </p:cNvPr>
@@ -5694,7 +5731,7 @@
           <p:cNvPr id="2" name="Title 1">
             <a:extLst>
               <a:ext uri="{FF2B5EF4-FFF2-40B4-BE49-F238E27FC236}">
-                <a16:creationId xmlns="" xmlns:a16="http://schemas.microsoft.com/office/drawing/2014/main" id="{9045A477-9EA3-4F5C-B4B9-8CE29E6FF138}"/>
+                <a16:creationId xmlns:a16="http://schemas.microsoft.com/office/drawing/2014/main" xmlns="" id="{9045A477-9EA3-4F5C-B4B9-8CE29E6FF138}"/>
               </a:ext>
             </a:extLst>
           </p:cNvPr>
@@ -5712,11 +5749,7 @@
           <a:p>
             <a:r>
               <a:rPr lang="en-US" dirty="0" smtClean="0"/>
-              <a:t>Baseline </a:t>
-            </a:r>
-            <a:r>
-              <a:rPr lang="en-US" dirty="0" smtClean="0"/>
-              <a:t>System: level and compression</a:t>
+              <a:t>Baseline System: level and compression</a:t>
             </a:r>
             <a:endParaRPr lang="en-US" dirty="0"/>
           </a:p>
@@ -5727,7 +5760,7 @@
           <p:cNvPr id="3" name="Content Placeholder 2">
             <a:extLst>
               <a:ext uri="{FF2B5EF4-FFF2-40B4-BE49-F238E27FC236}">
-                <a16:creationId xmlns="" xmlns:a16="http://schemas.microsoft.com/office/drawing/2014/main" id="{4FFC9F3E-C7DF-44CE-A057-14D5228F5C26}"/>
+                <a16:creationId xmlns:a16="http://schemas.microsoft.com/office/drawing/2014/main" xmlns="" id="{4FFC9F3E-C7DF-44CE-A057-14D5228F5C26}"/>
               </a:ext>
             </a:extLst>
           </p:cNvPr>
@@ -5762,11 +5795,7 @@
           <a:p>
             <a:r>
               <a:rPr lang="en-US" sz="2800" b="1" dirty="0" smtClean="0"/>
-              <a:t>Level </a:t>
-            </a:r>
-            <a:r>
-              <a:rPr lang="en-US" sz="2800" b="1" dirty="0" smtClean="0"/>
-              <a:t>balance</a:t>
+              <a:t>Level balance</a:t>
             </a:r>
           </a:p>
           <a:p>
@@ -5781,23 +5810,11 @@
             </a:r>
             <a:r>
               <a:rPr lang="sk-SK" sz="2400" dirty="0" smtClean="0"/>
-              <a:t> </a:t>
-            </a:r>
-            <a:r>
-              <a:rPr lang="sk-SK" sz="2400" dirty="0" smtClean="0"/>
-              <a:t>dB</a:t>
+              <a:t> dB</a:t>
             </a:r>
             <a:r>
               <a:rPr lang="en-US" sz="2400" dirty="0" smtClean="0"/>
-              <a:t> </a:t>
-            </a:r>
-            <a:r>
-              <a:rPr lang="en-US" sz="2400" dirty="0" smtClean="0"/>
-              <a:t>vocal-to-backing track </a:t>
-            </a:r>
-            <a:r>
-              <a:rPr lang="en-US" sz="2400" dirty="0" smtClean="0"/>
-              <a:t>ratio </a:t>
+              <a:t> vocal-to-backing track ratio </a:t>
             </a:r>
           </a:p>
           <a:p>
@@ -5814,11 +5831,7 @@
             <a:pPr lvl="1"/>
             <a:r>
               <a:rPr lang="en-US" sz="2400" dirty="0" smtClean="0"/>
-              <a:t>16.4 </a:t>
-            </a:r>
-            <a:r>
-              <a:rPr lang="en-US" sz="2400" dirty="0" smtClean="0"/>
-              <a:t>dB </a:t>
+              <a:t>16.4 dB </a:t>
             </a:r>
             <a:r>
               <a:rPr lang="en-US" sz="2400" dirty="0"/>
@@ -5826,13 +5839,8 @@
             </a:r>
             <a:r>
               <a:rPr lang="en-US" sz="2400" dirty="0" smtClean="0"/>
-              <a:t>oudness </a:t>
-            </a:r>
-            <a:r>
-              <a:rPr lang="en-US" sz="2400" dirty="0" smtClean="0"/>
-              <a:t>range</a:t>
-            </a:r>
-            <a:endParaRPr lang="en-US" sz="2400" dirty="0" smtClean="0"/>
+              <a:t>oudness range</a:t>
+            </a:r>
           </a:p>
         </p:txBody>
       </p:sp>
@@ -5878,7 +5886,7 @@
           <p:cNvPr id="2" name="Title 1">
             <a:extLst>
               <a:ext uri="{FF2B5EF4-FFF2-40B4-BE49-F238E27FC236}">
-                <a16:creationId xmlns="" xmlns:a16="http://schemas.microsoft.com/office/drawing/2014/main" id="{9045A477-9EA3-4F5C-B4B9-8CE29E6FF138}"/>
+                <a16:creationId xmlns:a16="http://schemas.microsoft.com/office/drawing/2014/main" xmlns="" id="{9045A477-9EA3-4F5C-B4B9-8CE29E6FF138}"/>
               </a:ext>
             </a:extLst>
           </p:cNvPr>
@@ -5896,11 +5904,7 @@
           <a:p>
             <a:r>
               <a:rPr lang="en-US" dirty="0" smtClean="0"/>
-              <a:t>Baseline </a:t>
-            </a:r>
-            <a:r>
-              <a:rPr lang="en-US" dirty="0" smtClean="0"/>
-              <a:t>System: EQ</a:t>
+              <a:t>Baseline System: EQ</a:t>
             </a:r>
             <a:endParaRPr lang="en-US" dirty="0"/>
           </a:p>
@@ -5911,7 +5915,7 @@
           <p:cNvPr id="3" name="Content Placeholder 2">
             <a:extLst>
               <a:ext uri="{FF2B5EF4-FFF2-40B4-BE49-F238E27FC236}">
-                <a16:creationId xmlns="" xmlns:a16="http://schemas.microsoft.com/office/drawing/2014/main" id="{4FFC9F3E-C7DF-44CE-A057-14D5228F5C26}"/>
+                <a16:creationId xmlns:a16="http://schemas.microsoft.com/office/drawing/2014/main" xmlns="" id="{4FFC9F3E-C7DF-44CE-A057-14D5228F5C26}"/>
               </a:ext>
             </a:extLst>
           </p:cNvPr>
@@ -5933,19 +5937,13 @@
               <a:rPr lang="en-US" sz="2800" b="1" dirty="0" smtClean="0"/>
               <a:t>EQ</a:t>
             </a:r>
-            <a:endParaRPr lang="en-US" sz="2800" b="1" dirty="0" smtClean="0"/>
           </a:p>
           <a:p>
             <a:pPr lvl="1"/>
             <a:r>
               <a:rPr lang="en-US" sz="2400" dirty="0" smtClean="0"/>
-              <a:t>Frequency </a:t>
-            </a:r>
-            <a:r>
-              <a:rPr lang="en-US" sz="2400" dirty="0" smtClean="0"/>
-              <a:t>unmasking</a:t>
-            </a:r>
-            <a:endParaRPr lang="en-US" sz="2400" dirty="0" smtClean="0"/>
+              <a:t>Frequency unmasking</a:t>
+            </a:r>
           </a:p>
         </p:txBody>
       </p:sp>
@@ -6021,7 +6019,7 @@
           <p:cNvPr id="2" name="Title 1">
             <a:extLst>
               <a:ext uri="{FF2B5EF4-FFF2-40B4-BE49-F238E27FC236}">
-                <a16:creationId xmlns="" xmlns:a16="http://schemas.microsoft.com/office/drawing/2014/main" id="{9045A477-9EA3-4F5C-B4B9-8CE29E6FF138}"/>
+                <a16:creationId xmlns:a16="http://schemas.microsoft.com/office/drawing/2014/main" xmlns="" id="{9045A477-9EA3-4F5C-B4B9-8CE29E6FF138}"/>
               </a:ext>
             </a:extLst>
           </p:cNvPr>
@@ -6039,11 +6037,7 @@
           <a:p>
             <a:r>
               <a:rPr lang="en-US" dirty="0" smtClean="0"/>
-              <a:t>Rule-based </a:t>
-            </a:r>
-            <a:r>
-              <a:rPr lang="en-US" dirty="0" smtClean="0"/>
-              <a:t>System: reverb</a:t>
+              <a:t>Rule-based System: reverb</a:t>
             </a:r>
             <a:endParaRPr lang="en-US" dirty="0"/>
           </a:p>
@@ -6054,7 +6048,7 @@
           <p:cNvPr id="3" name="Content Placeholder 2">
             <a:extLst>
               <a:ext uri="{FF2B5EF4-FFF2-40B4-BE49-F238E27FC236}">
-                <a16:creationId xmlns="" xmlns:a16="http://schemas.microsoft.com/office/drawing/2014/main" id="{4FFC9F3E-C7DF-44CE-A057-14D5228F5C26}"/>
+                <a16:creationId xmlns:a16="http://schemas.microsoft.com/office/drawing/2014/main" xmlns="" id="{4FFC9F3E-C7DF-44CE-A057-14D5228F5C26}"/>
               </a:ext>
             </a:extLst>
           </p:cNvPr>
@@ -6238,7 +6232,7 @@
           <p:cNvPr id="2" name="Title 1">
             <a:extLst>
               <a:ext uri="{FF2B5EF4-FFF2-40B4-BE49-F238E27FC236}">
-                <a16:creationId xmlns="" xmlns:a16="http://schemas.microsoft.com/office/drawing/2014/main" id="{9045A477-9EA3-4F5C-B4B9-8CE29E6FF138}"/>
+                <a16:creationId xmlns:a16="http://schemas.microsoft.com/office/drawing/2014/main" xmlns="" id="{9045A477-9EA3-4F5C-B4B9-8CE29E6FF138}"/>
               </a:ext>
             </a:extLst>
           </p:cNvPr>
@@ -6258,11 +6252,7 @@
           <a:p>
             <a:r>
               <a:rPr lang="en-US" dirty="0" smtClean="0"/>
-              <a:t>Data-driven </a:t>
-            </a:r>
-            <a:r>
-              <a:rPr lang="en-US" dirty="0" smtClean="0"/>
-              <a:t>System</a:t>
+              <a:t>Data-driven System</a:t>
             </a:r>
             <a:endParaRPr lang="en-US" dirty="0"/>
           </a:p>
@@ -6394,7 +6384,7 @@
           <p:cNvPr id="2" name="Title 1">
             <a:extLst>
               <a:ext uri="{FF2B5EF4-FFF2-40B4-BE49-F238E27FC236}">
-                <a16:creationId xmlns="" xmlns:a16="http://schemas.microsoft.com/office/drawing/2014/main" id="{9045A477-9EA3-4F5C-B4B9-8CE29E6FF138}"/>
+                <a16:creationId xmlns:a16="http://schemas.microsoft.com/office/drawing/2014/main" xmlns="" id="{9045A477-9EA3-4F5C-B4B9-8CE29E6FF138}"/>
               </a:ext>
             </a:extLst>
           </p:cNvPr>
@@ -6414,11 +6404,7 @@
           <a:p>
             <a:r>
               <a:rPr lang="en-US" dirty="0" smtClean="0"/>
-              <a:t>Data-driven </a:t>
-            </a:r>
-            <a:r>
-              <a:rPr lang="en-US" dirty="0" smtClean="0"/>
-              <a:t>System</a:t>
+              <a:t>Data-driven System</a:t>
             </a:r>
             <a:endParaRPr lang="en-US" dirty="0"/>
           </a:p>
@@ -6951,7 +6937,7 @@
           <p:cNvPr id="2" name="Title 1">
             <a:extLst>
               <a:ext uri="{FF2B5EF4-FFF2-40B4-BE49-F238E27FC236}">
-                <a16:creationId xmlns="" xmlns:a16="http://schemas.microsoft.com/office/drawing/2014/main" id="{9045A477-9EA3-4F5C-B4B9-8CE29E6FF138}"/>
+                <a16:creationId xmlns:a16="http://schemas.microsoft.com/office/drawing/2014/main" xmlns="" id="{9045A477-9EA3-4F5C-B4B9-8CE29E6FF138}"/>
               </a:ext>
             </a:extLst>
           </p:cNvPr>
@@ -7321,39 +7307,7 @@
                   </a:outerShdw>
                 </a:effectLst>
               </a:rPr>
-              <a:t>If the mixed vocal is boosted at </a:t>
-            </a:r>
-            <a:r>
-              <a:rPr lang="en-US" dirty="0" smtClean="0">
-                <a:ln w="0"/>
-                <a:solidFill>
-                  <a:schemeClr val="accent1"/>
-                </a:solidFill>
-                <a:effectLst>
-                  <a:outerShdw blurRad="38100" dist="25400" dir="5400000" algn="ctr" rotWithShape="0">
-                    <a:srgbClr val="6E747A">
-                      <a:alpha val="43000"/>
-                    </a:srgbClr>
-                  </a:outerShdw>
-                </a:effectLst>
-              </a:rPr>
-              <a:t>a center frequency,  </a:t>
-            </a:r>
-            <a:r>
-              <a:rPr lang="en-US" dirty="0" smtClean="0">
-                <a:ln w="0"/>
-                <a:solidFill>
-                  <a:schemeClr val="accent1"/>
-                </a:solidFill>
-                <a:effectLst>
-                  <a:outerShdw blurRad="38100" dist="25400" dir="5400000" algn="ctr" rotWithShape="0">
-                    <a:srgbClr val="6E747A">
-                      <a:alpha val="43000"/>
-                    </a:srgbClr>
-                  </a:outerShdw>
-                </a:effectLst>
-              </a:rPr>
-              <a:t>we should learn to cut at that frequency.</a:t>
+              <a:t>If the mixed vocal is boosted at a center frequency,  we should learn to cut at that frequency.</a:t>
             </a:r>
             <a:endParaRPr lang="en-US" dirty="0">
               <a:ln w="0"/>

</xml_diff>